<commit_message>
Added a bunch of things and updated the readme
</commit_message>
<xml_diff>
--- a/SparkClass1.pptx
+++ b/SparkClass1.pptx
@@ -6,7 +6,10 @@
   </p:sldMasterIdLst>
   <p:sldIdLst>
     <p:sldId id="256" r:id="rId2"/>
-    <p:sldId id="257" r:id="rId3"/>
+    <p:sldId id="261" r:id="rId3"/>
+    <p:sldId id="257" r:id="rId4"/>
+    <p:sldId id="258" r:id="rId5"/>
+    <p:sldId id="259" r:id="rId6"/>
   </p:sldIdLst>
   <p:sldSz cx="12192000" cy="6858000"/>
   <p:notesSz cx="6858000" cy="9144000"/>
@@ -105,7 +108,66 @@
       </a:defRPr>
     </a:lvl9pPr>
   </p:defaultTextStyle>
+  <p:extLst>
+    <p:ext uri="{EFAFB233-063F-42B5-8137-9DF3F51BA10A}">
+      <p15:sldGuideLst xmlns:p15="http://schemas.microsoft.com/office/powerpoint/2012/main"/>
+    </p:ext>
+  </p:extLst>
 </p:presentation>
+</file>
+
+<file path=ppt/ink/ink1.xml><?xml version="1.0" encoding="utf-8"?>
+<inkml:ink xmlns:inkml="http://www.w3.org/2003/InkML">
+  <inkml:definitions>
+    <inkml:context xml:id="ctx0">
+      <inkml:inkSource xml:id="inkSrc0">
+        <inkml:traceFormat>
+          <inkml:channel name="X" type="integer" min="-2.14748E9" max="2.14748E9" units="cm"/>
+          <inkml:channel name="Y" type="integer" min="-2.14748E9" max="2.14748E9" units="cm"/>
+          <inkml:channel name="F" type="integer" max="32767" units="dev"/>
+        </inkml:traceFormat>
+        <inkml:channelProperties>
+          <inkml:channelProperty channel="X" name="resolution" value="1000" units="1/cm"/>
+          <inkml:channelProperty channel="Y" name="resolution" value="1000" units="1/cm"/>
+          <inkml:channelProperty channel="F" name="resolution" value="0" units="1/dev"/>
+        </inkml:channelProperties>
+      </inkml:inkSource>
+      <inkml:timestamp xml:id="ts0" timeString="2023-08-17T15:07:37.824"/>
+    </inkml:context>
+    <inkml:brush xml:id="br0">
+      <inkml:brushProperty name="width" value="0.05" units="cm"/>
+      <inkml:brushProperty name="height" value="0.05" units="cm"/>
+    </inkml:brush>
+  </inkml:definitions>
+  <inkml:trace contextRef="#ctx0" brushRef="#br0">122 1525 24575,'-1'-7'0,"-1"0"0,0 0 0,0 0 0,-1 1 0,0-1 0,0 1 0,0-1 0,-1 1 0,-8-10 0,-8-18 0,8 8 0,1 0 0,2-1 0,0-1 0,2 1 0,1-1 0,2-1 0,0 1 0,2-1 0,1-37 0,1-9 0,-1 33 0,1 1 0,2-1 0,2 1 0,1-1 0,17-60 0,0 6 0,-20 78 0,2-1 0,0 1 0,1 0 0,0 0 0,2 1 0,15-30 0,-12 34 0,2 0 0,0 1 0,0 0 0,1 1 0,0 1 0,1 0 0,29-16 0,18-12 0,-48 29 0,0 1 0,1 1 0,0 0 0,0 1 0,25-7 0,81-15 0,-77 19 0,-15 3 0,-1-2 0,1 0 0,-2-2 0,1-1 0,36-21 0,-46 22 0,0 2 0,1 0 0,0 1 0,0 0 0,1 2 0,0 0 0,0 1 0,25-1 0,23-6 0,-43 7 0,1 0 0,25 0 0,-11 7 0,-1 1 0,1 2 0,-1 2 0,38 12 0,53 11 0,-89-22 0,-1 2 0,49 21 0,27 8 0,-59-22 0,-1 2 0,87 45 0,-141-65 0,-1 1 0,0-1 0,0 0 0,1 1 0,-1-1 0,0 0 0,1 1 0,-1-1 0,0 0 0,1 0 0,-1 1 0,0-1 0,1 0 0,-1 0 0,0 0 0,1 0 0,-1 1 0,1-1 0,-1 0 0,1 0 0,-1 0 0,0 0 0,1 0 0,-1 0 0,1 0 0,-1 0 0,1 0 0,-1 0 0,0 0 0,1 0 0,-1-1 0,1 1 0,-1 0 0,0 0 0,1 0 0,-1 0 0,1-1 0,-1 1 0,0 0 0,1-1 0,-11-17 0,-25-21 0,27 30 0,1-1 0,-1 0 0,1-1 0,1 0 0,-8-17 0,-12-20 0,16 34 0,-1 0 0,0 1 0,-1 0 0,-1 1 0,0 0 0,-22-15 0,-19-17-1365,40 32-5461</inkml:trace>
+</inkml:ink>
+</file>
+
+<file path=ppt/ink/ink2.xml><?xml version="1.0" encoding="utf-8"?>
+<inkml:ink xmlns:inkml="http://www.w3.org/2003/InkML">
+  <inkml:definitions>
+    <inkml:context xml:id="ctx0">
+      <inkml:inkSource xml:id="inkSrc0">
+        <inkml:traceFormat>
+          <inkml:channel name="X" type="integer" min="-2.14748E9" max="2.14748E9" units="cm"/>
+          <inkml:channel name="Y" type="integer" min="-2.14748E9" max="2.14748E9" units="cm"/>
+          <inkml:channel name="F" type="integer" max="32767" units="dev"/>
+        </inkml:traceFormat>
+        <inkml:channelProperties>
+          <inkml:channelProperty channel="X" name="resolution" value="1000" units="1/cm"/>
+          <inkml:channelProperty channel="Y" name="resolution" value="1000" units="1/cm"/>
+          <inkml:channelProperty channel="F" name="resolution" value="0" units="1/dev"/>
+        </inkml:channelProperties>
+      </inkml:inkSource>
+      <inkml:timestamp xml:id="ts0" timeString="2023-08-17T15:07:40.379"/>
+    </inkml:context>
+    <inkml:brush xml:id="br0">
+      <inkml:brushProperty name="width" value="0.05" units="cm"/>
+      <inkml:brushProperty name="height" value="0.05" units="cm"/>
+    </inkml:brush>
+  </inkml:definitions>
+  <inkml:trace contextRef="#ctx0" brushRef="#br0">283 1 24575,'0'4'0,"-4"1"0,-2 4 0,-3 0 0,-5 0 0,-3-3 0,-4-2 0,-1-2 0,-2-1 0,0 3 0,-1 1 0,5 4 0,5 4 0,1 0 0,0-2 0,-3-4 0,-2-2 0,2-2-8191</inkml:trace>
+</inkml:ink>
 </file>
 
 <file path=ppt/slideLayouts/slideLayout1.xml><?xml version="1.0" encoding="utf-8"?>
@@ -287,7 +349,7 @@
           <a:p>
             <a:fld id="{9AAD6989-EECE-4BC3-AB61-DF83749DB6EB}" type="datetimeFigureOut">
               <a:rPr lang="en-US" smtClean="0"/>
-              <a:t>2023-08-01</a:t>
+              <a:t>2023-08-16</a:t>
             </a:fld>
             <a:endParaRPr lang="en-US"/>
           </a:p>
@@ -455,7 +517,7 @@
           <a:p>
             <a:fld id="{9AAD6989-EECE-4BC3-AB61-DF83749DB6EB}" type="datetimeFigureOut">
               <a:rPr lang="en-US" smtClean="0"/>
-              <a:t>2023-08-01</a:t>
+              <a:t>2023-08-16</a:t>
             </a:fld>
             <a:endParaRPr lang="en-US"/>
           </a:p>
@@ -633,7 +695,7 @@
           <a:p>
             <a:fld id="{9AAD6989-EECE-4BC3-AB61-DF83749DB6EB}" type="datetimeFigureOut">
               <a:rPr lang="en-US" smtClean="0"/>
-              <a:t>2023-08-01</a:t>
+              <a:t>2023-08-16</a:t>
             </a:fld>
             <a:endParaRPr lang="en-US"/>
           </a:p>
@@ -801,7 +863,7 @@
           <a:p>
             <a:fld id="{9AAD6989-EECE-4BC3-AB61-DF83749DB6EB}" type="datetimeFigureOut">
               <a:rPr lang="en-US" smtClean="0"/>
-              <a:t>2023-08-01</a:t>
+              <a:t>2023-08-16</a:t>
             </a:fld>
             <a:endParaRPr lang="en-US"/>
           </a:p>
@@ -1046,7 +1108,7 @@
           <a:p>
             <a:fld id="{9AAD6989-EECE-4BC3-AB61-DF83749DB6EB}" type="datetimeFigureOut">
               <a:rPr lang="en-US" smtClean="0"/>
-              <a:t>2023-08-01</a:t>
+              <a:t>2023-08-16</a:t>
             </a:fld>
             <a:endParaRPr lang="en-US"/>
           </a:p>
@@ -1331,7 +1393,7 @@
           <a:p>
             <a:fld id="{9AAD6989-EECE-4BC3-AB61-DF83749DB6EB}" type="datetimeFigureOut">
               <a:rPr lang="en-US" smtClean="0"/>
-              <a:t>2023-08-01</a:t>
+              <a:t>2023-08-16</a:t>
             </a:fld>
             <a:endParaRPr lang="en-US"/>
           </a:p>
@@ -1750,7 +1812,7 @@
           <a:p>
             <a:fld id="{9AAD6989-EECE-4BC3-AB61-DF83749DB6EB}" type="datetimeFigureOut">
               <a:rPr lang="en-US" smtClean="0"/>
-              <a:t>2023-08-01</a:t>
+              <a:t>2023-08-16</a:t>
             </a:fld>
             <a:endParaRPr lang="en-US"/>
           </a:p>
@@ -1867,7 +1929,7 @@
           <a:p>
             <a:fld id="{9AAD6989-EECE-4BC3-AB61-DF83749DB6EB}" type="datetimeFigureOut">
               <a:rPr lang="en-US" smtClean="0"/>
-              <a:t>2023-08-01</a:t>
+              <a:t>2023-08-16</a:t>
             </a:fld>
             <a:endParaRPr lang="en-US"/>
           </a:p>
@@ -1962,7 +2024,7 @@
           <a:p>
             <a:fld id="{9AAD6989-EECE-4BC3-AB61-DF83749DB6EB}" type="datetimeFigureOut">
               <a:rPr lang="en-US" smtClean="0"/>
-              <a:t>2023-08-01</a:t>
+              <a:t>2023-08-16</a:t>
             </a:fld>
             <a:endParaRPr lang="en-US"/>
           </a:p>
@@ -2237,7 +2299,7 @@
           <a:p>
             <a:fld id="{9AAD6989-EECE-4BC3-AB61-DF83749DB6EB}" type="datetimeFigureOut">
               <a:rPr lang="en-US" smtClean="0"/>
-              <a:t>2023-08-01</a:t>
+              <a:t>2023-08-16</a:t>
             </a:fld>
             <a:endParaRPr lang="en-US"/>
           </a:p>
@@ -2492,7 +2554,7 @@
           <a:p>
             <a:fld id="{9AAD6989-EECE-4BC3-AB61-DF83749DB6EB}" type="datetimeFigureOut">
               <a:rPr lang="en-US" smtClean="0"/>
-              <a:t>2023-08-01</a:t>
+              <a:t>2023-08-16</a:t>
             </a:fld>
             <a:endParaRPr lang="en-US"/>
           </a:p>
@@ -2703,7 +2765,7 @@
           <a:p>
             <a:fld id="{9AAD6989-EECE-4BC3-AB61-DF83749DB6EB}" type="datetimeFigureOut">
               <a:rPr lang="en-US" smtClean="0"/>
-              <a:t>2023-08-01</a:t>
+              <a:t>2023-08-16</a:t>
             </a:fld>
             <a:endParaRPr lang="en-US"/>
           </a:p>
@@ -3169,6 +3231,358 @@
           <p:cNvPr id="2" name="Title 1">
             <a:extLst>
               <a:ext uri="{FF2B5EF4-FFF2-40B4-BE49-F238E27FC236}">
+                <a16:creationId xmlns:a16="http://schemas.microsoft.com/office/drawing/2014/main" id="{D0BA2781-9E47-5559-5326-5887EDBD535C}"/>
+              </a:ext>
+            </a:extLst>
+          </p:cNvPr>
+          <p:cNvSpPr>
+            <a:spLocks noGrp="1"/>
+          </p:cNvSpPr>
+          <p:nvPr>
+            <p:ph type="title"/>
+          </p:nvPr>
+        </p:nvSpPr>
+        <p:spPr>
+          <a:xfrm>
+            <a:off x="609600" y="78691"/>
+            <a:ext cx="10972800" cy="1143000"/>
+          </a:xfrm>
+        </p:spPr>
+        <p:txBody>
+          <a:bodyPr>
+            <a:normAutofit fontScale="90000"/>
+          </a:bodyPr>
+          <a:lstStyle/>
+          <a:p>
+            <a:r>
+              <a:rPr lang="en-US" b="1" dirty="0"/>
+              <a:t>First, lets try to think of some ideas without further context </a:t>
+            </a:r>
+            <a:r>
+              <a:rPr lang="en-US" dirty="0"/>
+              <a:t>– </a:t>
+            </a:r>
+            <a:r>
+              <a:rPr lang="en-US" sz="3600" i="1" dirty="0"/>
+              <a:t>just stream of consciousness thinking</a:t>
+            </a:r>
+            <a:endParaRPr lang="en-US" i="1" dirty="0"/>
+          </a:p>
+        </p:txBody>
+      </p:sp>
+      <p:sp>
+        <p:nvSpPr>
+          <p:cNvPr id="3" name="Content Placeholder 2">
+            <a:extLst>
+              <a:ext uri="{FF2B5EF4-FFF2-40B4-BE49-F238E27FC236}">
+                <a16:creationId xmlns:a16="http://schemas.microsoft.com/office/drawing/2014/main" id="{C87BC26F-F358-B3D7-99A0-E0E1165FBBA3}"/>
+              </a:ext>
+            </a:extLst>
+          </p:cNvPr>
+          <p:cNvSpPr>
+            <a:spLocks noGrp="1"/>
+          </p:cNvSpPr>
+          <p:nvPr>
+            <p:ph idx="1"/>
+          </p:nvPr>
+        </p:nvSpPr>
+        <p:spPr>
+          <a:xfrm>
+            <a:off x="609600" y="1441594"/>
+            <a:ext cx="10972800" cy="4525963"/>
+          </a:xfrm>
+        </p:spPr>
+        <p:txBody>
+          <a:bodyPr>
+            <a:normAutofit fontScale="92500" lnSpcReduction="20000"/>
+          </a:bodyPr>
+          <a:lstStyle/>
+          <a:p>
+            <a:r>
+              <a:rPr lang="en-US" dirty="0"/>
+              <a:t>We are going to do a little experiment</a:t>
+            </a:r>
+          </a:p>
+          <a:p>
+            <a:r>
+              <a:rPr lang="en-US" dirty="0"/>
+              <a:t>My hypothesis is that, out of context or prompting, coming up with novel ideas will be hard.  However, given the context of a this being the first real week in school, you mind is probably overloaded with new experiences.</a:t>
+            </a:r>
+          </a:p>
+          <a:p>
+            <a:r>
+              <a:rPr lang="en-US" dirty="0"/>
+              <a:t>The first part is simple: everyone open the URL in the QR code</a:t>
+            </a:r>
+          </a:p>
+          <a:p>
+            <a:pPr marL="0" indent="0">
+              <a:buNone/>
+            </a:pPr>
+            <a:r>
+              <a:rPr lang="en-US" dirty="0"/>
+              <a:t>(</a:t>
+            </a:r>
+            <a:r>
+              <a:rPr lang="en-US" dirty="0">
+                <a:hlinkClick r:id="rId2"/>
+              </a:rPr>
+              <a:t>https://docs.google.com/document/d/1xKAoHRXPhJ05KPif0aCSNWa4hFib7CsztdNVHlEg5vk/edit?usp=sharing</a:t>
+            </a:r>
+            <a:r>
+              <a:rPr lang="en-US" dirty="0"/>
+              <a:t> )</a:t>
+            </a:r>
+          </a:p>
+          <a:p>
+            <a:r>
+              <a:rPr lang="en-US" dirty="0"/>
+              <a:t>And, on a blank page write down all the ideas that </a:t>
+            </a:r>
+            <a:br>
+              <a:rPr lang="en-US" dirty="0"/>
+            </a:br>
+            <a:r>
+              <a:rPr lang="en-US" dirty="0"/>
+              <a:t>pop into your head!</a:t>
+            </a:r>
+          </a:p>
+        </p:txBody>
+      </p:sp>
+      <p:pic>
+        <p:nvPicPr>
+          <p:cNvPr id="5" name="Picture 4">
+            <a:extLst>
+              <a:ext uri="{FF2B5EF4-FFF2-40B4-BE49-F238E27FC236}">
+                <a16:creationId xmlns:a16="http://schemas.microsoft.com/office/drawing/2014/main" id="{A472CF94-B80F-FE49-3035-92C173BDD576}"/>
+              </a:ext>
+            </a:extLst>
+          </p:cNvPr>
+          <p:cNvPicPr>
+            <a:picLocks noChangeAspect="1"/>
+          </p:cNvPicPr>
+          <p:nvPr/>
+        </p:nvPicPr>
+        <p:blipFill>
+          <a:blip r:embed="rId3">
+            <a:extLst>
+              <a:ext uri="{28A0092B-C50C-407E-A947-70E740481C1C}">
+                <a14:useLocalDpi xmlns:a14="http://schemas.microsoft.com/office/drawing/2010/main" val="0"/>
+              </a:ext>
+            </a:extLst>
+          </a:blip>
+          <a:srcRect/>
+          <a:stretch/>
+        </p:blipFill>
+        <p:spPr>
+          <a:xfrm>
+            <a:off x="9990183" y="4653292"/>
+            <a:ext cx="1969806" cy="1969806"/>
+          </a:xfrm>
+          <a:prstGeom prst="rect">
+            <a:avLst/>
+          </a:prstGeom>
+        </p:spPr>
+      </p:pic>
+      <p:sp>
+        <p:nvSpPr>
+          <p:cNvPr id="6" name="TextBox 5">
+            <a:extLst>
+              <a:ext uri="{FF2B5EF4-FFF2-40B4-BE49-F238E27FC236}">
+                <a16:creationId xmlns:a16="http://schemas.microsoft.com/office/drawing/2014/main" id="{65343F2D-E685-91C7-0039-7B5E984421E6}"/>
+              </a:ext>
+            </a:extLst>
+          </p:cNvPr>
+          <p:cNvSpPr txBox="1"/>
+          <p:nvPr/>
+        </p:nvSpPr>
+        <p:spPr>
+          <a:xfrm>
+            <a:off x="7684097" y="5976767"/>
+            <a:ext cx="2069797" cy="646331"/>
+          </a:xfrm>
+          <a:prstGeom prst="rect">
+            <a:avLst/>
+          </a:prstGeom>
+          <a:noFill/>
+        </p:spPr>
+        <p:txBody>
+          <a:bodyPr wrap="none" rtlCol="0">
+            <a:spAutoFit/>
+          </a:bodyPr>
+          <a:lstStyle/>
+          <a:p>
+            <a:r>
+              <a:rPr lang="en-US" dirty="0"/>
+              <a:t>Link to Google Doc</a:t>
+            </a:r>
+          </a:p>
+          <a:p>
+            <a:r>
+              <a:rPr lang="en-US" dirty="0"/>
+              <a:t>for ideas, no context</a:t>
+            </a:r>
+          </a:p>
+        </p:txBody>
+      </p:sp>
+      <p:grpSp>
+        <p:nvGrpSpPr>
+          <p:cNvPr id="8" name="Group 7">
+            <a:extLst>
+              <a:ext uri="{FF2B5EF4-FFF2-40B4-BE49-F238E27FC236}">
+                <a16:creationId xmlns:a16="http://schemas.microsoft.com/office/drawing/2014/main" id="{3319EDEA-E2FE-513E-66D6-B4FC356BA0E4}"/>
+              </a:ext>
+            </a:extLst>
+          </p:cNvPr>
+          <p:cNvGrpSpPr/>
+          <p:nvPr/>
+        </p:nvGrpSpPr>
+        <p:grpSpPr>
+          <a:xfrm>
+            <a:off x="9082820" y="5398584"/>
+            <a:ext cx="730440" cy="549360"/>
+            <a:chOff x="9082820" y="5398584"/>
+            <a:chExt cx="730440" cy="549360"/>
+          </a:xfrm>
+        </p:grpSpPr>
+        <mc:AlternateContent xmlns:mc="http://schemas.openxmlformats.org/markup-compatibility/2006">
+          <mc:Choice xmlns:p14="http://schemas.microsoft.com/office/powerpoint/2010/main" Requires="p14">
+            <p:contentPart p14:bwMode="auto" r:id="rId4">
+              <p14:nvContentPartPr>
+                <p14:cNvPr id="4" name="Ink 3">
+                  <a:extLst>
+                    <a:ext uri="{FF2B5EF4-FFF2-40B4-BE49-F238E27FC236}">
+                      <a16:creationId xmlns:a16="http://schemas.microsoft.com/office/drawing/2014/main" id="{B1ED2B97-E512-7229-6D01-A20FFBD18725}"/>
+                    </a:ext>
+                  </a:extLst>
+                </p14:cNvPr>
+                <p14:cNvContentPartPr/>
+                <p14:nvPr/>
+              </p14:nvContentPartPr>
+              <p14:xfrm>
+                <a:off x="9082820" y="5398584"/>
+                <a:ext cx="730440" cy="549360"/>
+              </p14:xfrm>
+            </p:contentPart>
+          </mc:Choice>
+          <mc:Fallback>
+            <p:pic>
+              <p:nvPicPr>
+                <p:cNvPr id="4" name="Ink 3">
+                  <a:extLst>
+                    <a:ext uri="{FF2B5EF4-FFF2-40B4-BE49-F238E27FC236}">
+                      <a16:creationId xmlns:a16="http://schemas.microsoft.com/office/drawing/2014/main" id="{B1ED2B97-E512-7229-6D01-A20FFBD18725}"/>
+                    </a:ext>
+                  </a:extLst>
+                </p:cNvPr>
+                <p:cNvPicPr/>
+                <p:nvPr/>
+              </p:nvPicPr>
+              <p:blipFill>
+                <a:blip r:embed="rId5"/>
+                <a:stretch>
+                  <a:fillRect/>
+                </a:stretch>
+              </p:blipFill>
+              <p:spPr>
+                <a:xfrm>
+                  <a:off x="9074180" y="5389584"/>
+                  <a:ext cx="748080" cy="567000"/>
+                </a:xfrm>
+                <a:prstGeom prst="rect">
+                  <a:avLst/>
+                </a:prstGeom>
+              </p:spPr>
+            </p:pic>
+          </mc:Fallback>
+        </mc:AlternateContent>
+        <mc:AlternateContent xmlns:mc="http://schemas.openxmlformats.org/markup-compatibility/2006">
+          <mc:Choice xmlns:p14="http://schemas.microsoft.com/office/powerpoint/2010/main" Requires="p14">
+            <p:contentPart p14:bwMode="auto" r:id="rId6">
+              <p14:nvContentPartPr>
+                <p14:cNvPr id="7" name="Ink 6">
+                  <a:extLst>
+                    <a:ext uri="{FF2B5EF4-FFF2-40B4-BE49-F238E27FC236}">
+                      <a16:creationId xmlns:a16="http://schemas.microsoft.com/office/drawing/2014/main" id="{FA68CB98-AD27-72AB-5B77-20EDD2EEDE58}"/>
+                    </a:ext>
+                  </a:extLst>
+                </p14:cNvPr>
+                <p14:cNvContentPartPr/>
+                <p14:nvPr/>
+              </p14:nvContentPartPr>
+              <p14:xfrm>
+                <a:off x="9691580" y="5528904"/>
+                <a:ext cx="101880" cy="43560"/>
+              </p14:xfrm>
+            </p:contentPart>
+          </mc:Choice>
+          <mc:Fallback>
+            <p:pic>
+              <p:nvPicPr>
+                <p:cNvPr id="7" name="Ink 6">
+                  <a:extLst>
+                    <a:ext uri="{FF2B5EF4-FFF2-40B4-BE49-F238E27FC236}">
+                      <a16:creationId xmlns:a16="http://schemas.microsoft.com/office/drawing/2014/main" id="{FA68CB98-AD27-72AB-5B77-20EDD2EEDE58}"/>
+                    </a:ext>
+                  </a:extLst>
+                </p:cNvPr>
+                <p:cNvPicPr/>
+                <p:nvPr/>
+              </p:nvPicPr>
+              <p:blipFill>
+                <a:blip r:embed="rId7"/>
+                <a:stretch>
+                  <a:fillRect/>
+                </a:stretch>
+              </p:blipFill>
+              <p:spPr>
+                <a:xfrm>
+                  <a:off x="9682940" y="5520264"/>
+                  <a:ext cx="119520" cy="61200"/>
+                </a:xfrm>
+                <a:prstGeom prst="rect">
+                  <a:avLst/>
+                </a:prstGeom>
+              </p:spPr>
+            </p:pic>
+          </mc:Fallback>
+        </mc:AlternateContent>
+      </p:grpSp>
+    </p:spTree>
+    <p:extLst>
+      <p:ext uri="{BB962C8B-B14F-4D97-AF65-F5344CB8AC3E}">
+        <p14:creationId xmlns:p14="http://schemas.microsoft.com/office/powerpoint/2010/main" val="1918750273"/>
+      </p:ext>
+    </p:extLst>
+  </p:cSld>
+  <p:clrMapOvr>
+    <a:masterClrMapping/>
+  </p:clrMapOvr>
+</p:sld>
+</file>
+
+<file path=ppt/slides/slide3.xml><?xml version="1.0" encoding="utf-8"?>
+<p:sld xmlns:a="http://schemas.openxmlformats.org/drawingml/2006/main" xmlns:r="http://schemas.openxmlformats.org/officeDocument/2006/relationships" xmlns:p="http://schemas.openxmlformats.org/presentationml/2006/main">
+  <p:cSld>
+    <p:spTree>
+      <p:nvGrpSpPr>
+        <p:cNvPr id="1" name=""/>
+        <p:cNvGrpSpPr/>
+        <p:nvPr/>
+      </p:nvGrpSpPr>
+      <p:grpSpPr>
+        <a:xfrm>
+          <a:off x="0" y="0"/>
+          <a:ext cx="0" cy="0"/>
+          <a:chOff x="0" y="0"/>
+          <a:chExt cx="0" cy="0"/>
+        </a:xfrm>
+      </p:grpSpPr>
+      <p:sp>
+        <p:nvSpPr>
+          <p:cNvPr id="2" name="Title 1">
+            <a:extLst>
+              <a:ext uri="{FF2B5EF4-FFF2-40B4-BE49-F238E27FC236}">
                 <a16:creationId xmlns:a16="http://schemas.microsoft.com/office/drawing/2014/main" id="{019077F3-B7AC-B993-7AA1-568D38F42E74}"/>
               </a:ext>
             </a:extLst>
@@ -3185,7 +3599,10 @@
           <a:bodyPr/>
           <a:lstStyle/>
           <a:p>
-            <a:endParaRPr lang="en-US" dirty="0"/>
+            <a:r>
+              <a:rPr lang="en-US" b="1" dirty="0"/>
+              <a:t>Introductions</a:t>
+            </a:r>
           </a:p>
         </p:txBody>
       </p:sp>
@@ -3210,7 +3627,44 @@
           <a:bodyPr/>
           <a:lstStyle/>
           <a:p>
-            <a:endParaRPr lang="en-US"/>
+            <a:r>
+              <a:rPr lang="en-US" dirty="0"/>
+              <a:t>First, lets go around the room and interduce ourselves</a:t>
+            </a:r>
+          </a:p>
+          <a:p>
+            <a:r>
+              <a:rPr lang="en-US" dirty="0"/>
+              <a:t>Share:</a:t>
+            </a:r>
+          </a:p>
+          <a:p>
+            <a:pPr lvl="1"/>
+            <a:r>
+              <a:rPr lang="en-US" dirty="0"/>
+              <a:t>Your name</a:t>
+            </a:r>
+          </a:p>
+          <a:p>
+            <a:pPr lvl="1"/>
+            <a:r>
+              <a:rPr lang="en-US" dirty="0"/>
+              <a:t>What department you are in</a:t>
+            </a:r>
+          </a:p>
+          <a:p>
+            <a:pPr lvl="1"/>
+            <a:r>
+              <a:rPr lang="en-US" dirty="0"/>
+              <a:t>Why you decided to take this class</a:t>
+            </a:r>
+          </a:p>
+          <a:p>
+            <a:pPr lvl="1"/>
+            <a:r>
+              <a:rPr lang="en-US" dirty="0"/>
+              <a:t>Complete the sentence: “By the end of this class, I hope to know…”</a:t>
+            </a:r>
           </a:p>
         </p:txBody>
       </p:sp>
@@ -3218,6 +3672,293 @@
     <p:extLst>
       <p:ext uri="{BB962C8B-B14F-4D97-AF65-F5344CB8AC3E}">
         <p14:creationId xmlns:p14="http://schemas.microsoft.com/office/powerpoint/2010/main" val="573191335"/>
+      </p:ext>
+    </p:extLst>
+  </p:cSld>
+  <p:clrMapOvr>
+    <a:masterClrMapping/>
+  </p:clrMapOvr>
+</p:sld>
+</file>
+
+<file path=ppt/slides/slide4.xml><?xml version="1.0" encoding="utf-8"?>
+<p:sld xmlns:a="http://schemas.openxmlformats.org/drawingml/2006/main" xmlns:r="http://schemas.openxmlformats.org/officeDocument/2006/relationships" xmlns:p="http://schemas.openxmlformats.org/presentationml/2006/main">
+  <p:cSld>
+    <p:spTree>
+      <p:nvGrpSpPr>
+        <p:cNvPr id="1" name=""/>
+        <p:cNvGrpSpPr/>
+        <p:nvPr/>
+      </p:nvGrpSpPr>
+      <p:grpSpPr>
+        <a:xfrm>
+          <a:off x="0" y="0"/>
+          <a:ext cx="0" cy="0"/>
+          <a:chOff x="0" y="0"/>
+          <a:chExt cx="0" cy="0"/>
+        </a:xfrm>
+      </p:grpSpPr>
+      <p:sp>
+        <p:nvSpPr>
+          <p:cNvPr id="2" name="Title 1">
+            <a:extLst>
+              <a:ext uri="{FF2B5EF4-FFF2-40B4-BE49-F238E27FC236}">
+                <a16:creationId xmlns:a16="http://schemas.microsoft.com/office/drawing/2014/main" id="{0FF3B030-B1B3-57E7-7BCF-24430D959FCA}"/>
+              </a:ext>
+            </a:extLst>
+          </p:cNvPr>
+          <p:cNvSpPr>
+            <a:spLocks noGrp="1"/>
+          </p:cNvSpPr>
+          <p:nvPr>
+            <p:ph type="title"/>
+          </p:nvPr>
+        </p:nvSpPr>
+        <p:spPr>
+          <a:xfrm>
+            <a:off x="609600" y="274638"/>
+            <a:ext cx="10972800" cy="1143000"/>
+          </a:xfrm>
+        </p:spPr>
+        <p:txBody>
+          <a:bodyPr anchor="ctr">
+            <a:normAutofit/>
+          </a:bodyPr>
+          <a:lstStyle/>
+          <a:p>
+            <a:r>
+              <a:rPr lang="en-US" b="1" dirty="0"/>
+              <a:t>Does everyone have a GitHub account?</a:t>
+            </a:r>
+          </a:p>
+        </p:txBody>
+      </p:sp>
+      <p:sp>
+        <p:nvSpPr>
+          <p:cNvPr id="3" name="Content Placeholder 2">
+            <a:extLst>
+              <a:ext uri="{FF2B5EF4-FFF2-40B4-BE49-F238E27FC236}">
+                <a16:creationId xmlns:a16="http://schemas.microsoft.com/office/drawing/2014/main" id="{F3AE6CBF-09A5-A30A-AB8B-2C3D03D7330E}"/>
+              </a:ext>
+            </a:extLst>
+          </p:cNvPr>
+          <p:cNvSpPr>
+            <a:spLocks noGrp="1"/>
+          </p:cNvSpPr>
+          <p:nvPr>
+            <p:ph sz="half" idx="1"/>
+          </p:nvPr>
+        </p:nvSpPr>
+        <p:spPr>
+          <a:xfrm>
+            <a:off x="196553" y="1600201"/>
+            <a:ext cx="5797847" cy="4525963"/>
+          </a:xfrm>
+        </p:spPr>
+        <p:txBody>
+          <a:bodyPr>
+            <a:normAutofit/>
+          </a:bodyPr>
+          <a:lstStyle/>
+          <a:p>
+            <a:r>
+              <a:rPr lang="en-US" dirty="0"/>
+              <a:t>We will be using GitHub for several things throughout the semester</a:t>
+            </a:r>
+          </a:p>
+          <a:p>
+            <a:r>
+              <a:rPr lang="en-US" dirty="0"/>
+              <a:t>The class repository is here: </a:t>
+            </a:r>
+            <a:r>
+              <a:rPr lang="en-US" dirty="0">
+                <a:hlinkClick r:id="rId2"/>
+              </a:rPr>
+              <a:t>https://github.com/other-realm/spark</a:t>
+            </a:r>
+            <a:endParaRPr lang="en-US" dirty="0"/>
+          </a:p>
+          <a:p>
+            <a:endParaRPr lang="en-US" dirty="0"/>
+          </a:p>
+        </p:txBody>
+      </p:sp>
+      <p:pic>
+        <p:nvPicPr>
+          <p:cNvPr id="7" name="Graphic 6" descr="A black cat in a circle, depicting the GitHub Logo">
+            <a:extLst>
+              <a:ext uri="{FF2B5EF4-FFF2-40B4-BE49-F238E27FC236}">
+                <a16:creationId xmlns:a16="http://schemas.microsoft.com/office/drawing/2014/main" id="{B5CD2A60-56D2-AF54-5640-4ADC7536FDFD}"/>
+              </a:ext>
+            </a:extLst>
+          </p:cNvPr>
+          <p:cNvPicPr>
+            <a:picLocks noChangeAspect="1"/>
+          </p:cNvPicPr>
+          <p:nvPr/>
+        </p:nvPicPr>
+        <p:blipFill>
+          <a:blip r:embed="rId3">
+            <a:extLst>
+              <a:ext uri="{28A0092B-C50C-407E-A947-70E740481C1C}">
+                <a14:useLocalDpi xmlns:a14="http://schemas.microsoft.com/office/drawing/2010/main" val="0"/>
+              </a:ext>
+              <a:ext uri="{96DAC541-7B7A-43D3-8B79-37D633B846F1}">
+                <asvg:svgBlip xmlns:asvg="http://schemas.microsoft.com/office/drawing/2016/SVG/main" r:embed="rId4"/>
+              </a:ext>
+            </a:extLst>
+          </a:blip>
+          <a:stretch>
+            <a:fillRect/>
+          </a:stretch>
+        </p:blipFill>
+        <p:spPr>
+          <a:xfrm>
+            <a:off x="6458216" y="1600201"/>
+            <a:ext cx="5124183" cy="5019608"/>
+          </a:xfrm>
+          <a:prstGeom prst="rect">
+            <a:avLst/>
+          </a:prstGeom>
+        </p:spPr>
+      </p:pic>
+    </p:spTree>
+    <p:extLst>
+      <p:ext uri="{BB962C8B-B14F-4D97-AF65-F5344CB8AC3E}">
+        <p14:creationId xmlns:p14="http://schemas.microsoft.com/office/powerpoint/2010/main" val="2654895551"/>
+      </p:ext>
+    </p:extLst>
+  </p:cSld>
+  <p:clrMapOvr>
+    <a:masterClrMapping/>
+  </p:clrMapOvr>
+</p:sld>
+</file>
+
+<file path=ppt/slides/slide5.xml><?xml version="1.0" encoding="utf-8"?>
+<p:sld xmlns:a="http://schemas.openxmlformats.org/drawingml/2006/main" xmlns:r="http://schemas.openxmlformats.org/officeDocument/2006/relationships" xmlns:p="http://schemas.openxmlformats.org/presentationml/2006/main">
+  <p:cSld>
+    <p:spTree>
+      <p:nvGrpSpPr>
+        <p:cNvPr id="1" name=""/>
+        <p:cNvGrpSpPr/>
+        <p:nvPr/>
+      </p:nvGrpSpPr>
+      <p:grpSpPr>
+        <a:xfrm>
+          <a:off x="0" y="0"/>
+          <a:ext cx="0" cy="0"/>
+          <a:chOff x="0" y="0"/>
+          <a:chExt cx="0" cy="0"/>
+        </a:xfrm>
+      </p:grpSpPr>
+      <p:sp>
+        <p:nvSpPr>
+          <p:cNvPr id="5" name="Title 4">
+            <a:extLst>
+              <a:ext uri="{FF2B5EF4-FFF2-40B4-BE49-F238E27FC236}">
+                <a16:creationId xmlns:a16="http://schemas.microsoft.com/office/drawing/2014/main" id="{E12AE8E1-0BA0-9F7D-363C-F11EC2C4A7D9}"/>
+              </a:ext>
+            </a:extLst>
+          </p:cNvPr>
+          <p:cNvSpPr>
+            <a:spLocks noGrp="1"/>
+          </p:cNvSpPr>
+          <p:nvPr>
+            <p:ph type="title"/>
+          </p:nvPr>
+        </p:nvSpPr>
+        <p:spPr/>
+        <p:txBody>
+          <a:bodyPr>
+            <a:normAutofit fontScale="90000"/>
+          </a:bodyPr>
+          <a:lstStyle/>
+          <a:p>
+            <a:r>
+              <a:rPr lang="en-US" b="1" dirty="0"/>
+              <a:t>Week 1 Assignment: Resources and setting things up </a:t>
+            </a:r>
+          </a:p>
+        </p:txBody>
+      </p:sp>
+      <p:sp>
+        <p:nvSpPr>
+          <p:cNvPr id="6" name="Content Placeholder 5">
+            <a:extLst>
+              <a:ext uri="{FF2B5EF4-FFF2-40B4-BE49-F238E27FC236}">
+                <a16:creationId xmlns:a16="http://schemas.microsoft.com/office/drawing/2014/main" id="{F15409BD-5448-4578-3676-4016D5645EEE}"/>
+              </a:ext>
+            </a:extLst>
+          </p:cNvPr>
+          <p:cNvSpPr>
+            <a:spLocks noGrp="1"/>
+          </p:cNvSpPr>
+          <p:nvPr>
+            <p:ph idx="1"/>
+          </p:nvPr>
+        </p:nvSpPr>
+        <p:spPr/>
+        <p:txBody>
+          <a:bodyPr/>
+          <a:lstStyle/>
+          <a:p>
+            <a:r>
+              <a:rPr lang="en-US" dirty="0">
+                <a:effectLst/>
+                <a:latin typeface="times new roman" panose="02020603050405020304" pitchFamily="18" charset="0"/>
+              </a:rPr>
+              <a:t>This week's assignment will be to finish getting set up the software/accounts we will be using during the rest of the semester and to read the syllabus.  </a:t>
+            </a:r>
+            <a:endParaRPr lang="en-US" dirty="0"/>
+          </a:p>
+          <a:p>
+            <a:pPr lvl="1"/>
+            <a:r>
+              <a:rPr lang="en-US" dirty="0">
+                <a:effectLst/>
+                <a:latin typeface="times new roman" panose="02020603050405020304" pitchFamily="18" charset="0"/>
+              </a:rPr>
+              <a:t>Submit:</a:t>
+            </a:r>
+            <a:endParaRPr lang="en-US" dirty="0"/>
+          </a:p>
+          <a:p>
+            <a:pPr lvl="2"/>
+            <a:r>
+              <a:rPr lang="en-US" dirty="0">
+                <a:effectLst/>
+                <a:latin typeface="times new roman" panose="02020603050405020304" pitchFamily="18" charset="0"/>
+              </a:rPr>
+              <a:t>A link to your GitHub account so that I can add you to our team.</a:t>
+            </a:r>
+            <a:endParaRPr lang="en-US" dirty="0">
+              <a:effectLst/>
+            </a:endParaRPr>
+          </a:p>
+          <a:p>
+            <a:pPr lvl="2"/>
+            <a:r>
+              <a:rPr lang="en-US" dirty="0">
+                <a:effectLst/>
+                <a:latin typeface="times new roman" panose="02020603050405020304" pitchFamily="18" charset="0"/>
+              </a:rPr>
+              <a:t>Any questions, concerns, ideas, or other info you have</a:t>
+            </a:r>
+            <a:endParaRPr lang="en-US" dirty="0">
+              <a:effectLst/>
+            </a:endParaRPr>
+          </a:p>
+          <a:p>
+            <a:endParaRPr lang="en-US" dirty="0"/>
+          </a:p>
+        </p:txBody>
+      </p:sp>
+    </p:spTree>
+    <p:extLst>
+      <p:ext uri="{BB962C8B-B14F-4D97-AF65-F5344CB8AC3E}">
+        <p14:creationId xmlns:p14="http://schemas.microsoft.com/office/powerpoint/2010/main" val="2776105428"/>
       </p:ext>
     </p:extLst>
   </p:cSld>

</xml_diff>

<commit_message>
Working on class content
</commit_message>
<xml_diff>
--- a/SparkClass1.pptx
+++ b/SparkClass1.pptx
@@ -6,7 +6,7 @@
   </p:sldMasterIdLst>
   <p:sldIdLst>
     <p:sldId id="256" r:id="rId2"/>
-    <p:sldId id="261" r:id="rId3"/>
+    <p:sldId id="262" r:id="rId3"/>
     <p:sldId id="257" r:id="rId4"/>
     <p:sldId id="258" r:id="rId5"/>
     <p:sldId id="259" r:id="rId6"/>
@@ -170,6 +170,33 @@
 </inkml:ink>
 </file>
 
+<file path=ppt/ink/ink3.xml><?xml version="1.0" encoding="utf-8"?>
+<inkml:ink xmlns:inkml="http://www.w3.org/2003/InkML">
+  <inkml:definitions>
+    <inkml:context xml:id="ctx0">
+      <inkml:inkSource xml:id="inkSrc0">
+        <inkml:traceFormat>
+          <inkml:channel name="X" type="integer" min="-2.14748E9" max="2.14748E9" units="cm"/>
+          <inkml:channel name="Y" type="integer" min="-2.14748E9" max="2.14748E9" units="cm"/>
+          <inkml:channel name="F" type="integer" max="32767" units="dev"/>
+        </inkml:traceFormat>
+        <inkml:channelProperties>
+          <inkml:channelProperty channel="X" name="resolution" value="1000" units="1/cm"/>
+          <inkml:channelProperty channel="Y" name="resolution" value="1000" units="1/cm"/>
+          <inkml:channelProperty channel="F" name="resolution" value="0" units="1/dev"/>
+        </inkml:channelProperties>
+      </inkml:inkSource>
+      <inkml:timestamp xml:id="ts0" timeString="2023-08-17T15:08:52.274"/>
+    </inkml:context>
+    <inkml:brush xml:id="br0">
+      <inkml:brushProperty name="width" value="0.05" units="cm"/>
+      <inkml:brushProperty name="height" value="0.05" units="cm"/>
+    </inkml:brush>
+  </inkml:definitions>
+  <inkml:trace contextRef="#ctx0" brushRef="#br0">1 1 24575</inkml:trace>
+</inkml:ink>
+</file>
+
 <file path=ppt/slideLayouts/slideLayout1.xml><?xml version="1.0" encoding="utf-8"?>
 <p:sldLayout xmlns:a="http://schemas.openxmlformats.org/drawingml/2006/main" xmlns:r="http://schemas.openxmlformats.org/officeDocument/2006/relationships" xmlns:p="http://schemas.openxmlformats.org/presentationml/2006/main" type="title" preserve="1">
   <p:cSld name="Title Slide">
@@ -349,7 +376,7 @@
           <a:p>
             <a:fld id="{9AAD6989-EECE-4BC3-AB61-DF83749DB6EB}" type="datetimeFigureOut">
               <a:rPr lang="en-US" smtClean="0"/>
-              <a:t>2023-08-16</a:t>
+              <a:t>2023-09-03</a:t>
             </a:fld>
             <a:endParaRPr lang="en-US"/>
           </a:p>
@@ -517,7 +544,7 @@
           <a:p>
             <a:fld id="{9AAD6989-EECE-4BC3-AB61-DF83749DB6EB}" type="datetimeFigureOut">
               <a:rPr lang="en-US" smtClean="0"/>
-              <a:t>2023-08-16</a:t>
+              <a:t>2023-09-03</a:t>
             </a:fld>
             <a:endParaRPr lang="en-US"/>
           </a:p>
@@ -695,7 +722,7 @@
           <a:p>
             <a:fld id="{9AAD6989-EECE-4BC3-AB61-DF83749DB6EB}" type="datetimeFigureOut">
               <a:rPr lang="en-US" smtClean="0"/>
-              <a:t>2023-08-16</a:t>
+              <a:t>2023-09-03</a:t>
             </a:fld>
             <a:endParaRPr lang="en-US"/>
           </a:p>
@@ -863,7 +890,7 @@
           <a:p>
             <a:fld id="{9AAD6989-EECE-4BC3-AB61-DF83749DB6EB}" type="datetimeFigureOut">
               <a:rPr lang="en-US" smtClean="0"/>
-              <a:t>2023-08-16</a:t>
+              <a:t>2023-09-03</a:t>
             </a:fld>
             <a:endParaRPr lang="en-US"/>
           </a:p>
@@ -1108,7 +1135,7 @@
           <a:p>
             <a:fld id="{9AAD6989-EECE-4BC3-AB61-DF83749DB6EB}" type="datetimeFigureOut">
               <a:rPr lang="en-US" smtClean="0"/>
-              <a:t>2023-08-16</a:t>
+              <a:t>2023-09-03</a:t>
             </a:fld>
             <a:endParaRPr lang="en-US"/>
           </a:p>
@@ -1393,7 +1420,7 @@
           <a:p>
             <a:fld id="{9AAD6989-EECE-4BC3-AB61-DF83749DB6EB}" type="datetimeFigureOut">
               <a:rPr lang="en-US" smtClean="0"/>
-              <a:t>2023-08-16</a:t>
+              <a:t>2023-09-03</a:t>
             </a:fld>
             <a:endParaRPr lang="en-US"/>
           </a:p>
@@ -1812,7 +1839,7 @@
           <a:p>
             <a:fld id="{9AAD6989-EECE-4BC3-AB61-DF83749DB6EB}" type="datetimeFigureOut">
               <a:rPr lang="en-US" smtClean="0"/>
-              <a:t>2023-08-16</a:t>
+              <a:t>2023-09-03</a:t>
             </a:fld>
             <a:endParaRPr lang="en-US"/>
           </a:p>
@@ -1929,7 +1956,7 @@
           <a:p>
             <a:fld id="{9AAD6989-EECE-4BC3-AB61-DF83749DB6EB}" type="datetimeFigureOut">
               <a:rPr lang="en-US" smtClean="0"/>
-              <a:t>2023-08-16</a:t>
+              <a:t>2023-09-03</a:t>
             </a:fld>
             <a:endParaRPr lang="en-US"/>
           </a:p>
@@ -2024,7 +2051,7 @@
           <a:p>
             <a:fld id="{9AAD6989-EECE-4BC3-AB61-DF83749DB6EB}" type="datetimeFigureOut">
               <a:rPr lang="en-US" smtClean="0"/>
-              <a:t>2023-08-16</a:t>
+              <a:t>2023-09-03</a:t>
             </a:fld>
             <a:endParaRPr lang="en-US"/>
           </a:p>
@@ -2299,7 +2326,7 @@
           <a:p>
             <a:fld id="{9AAD6989-EECE-4BC3-AB61-DF83749DB6EB}" type="datetimeFigureOut">
               <a:rPr lang="en-US" smtClean="0"/>
-              <a:t>2023-08-16</a:t>
+              <a:t>2023-09-03</a:t>
             </a:fld>
             <a:endParaRPr lang="en-US"/>
           </a:p>
@@ -2554,7 +2581,7 @@
           <a:p>
             <a:fld id="{9AAD6989-EECE-4BC3-AB61-DF83749DB6EB}" type="datetimeFigureOut">
               <a:rPr lang="en-US" smtClean="0"/>
-              <a:t>2023-08-16</a:t>
+              <a:t>2023-09-03</a:t>
             </a:fld>
             <a:endParaRPr lang="en-US"/>
           </a:p>
@@ -2765,7 +2792,7 @@
           <a:p>
             <a:fld id="{9AAD6989-EECE-4BC3-AB61-DF83749DB6EB}" type="datetimeFigureOut">
               <a:rPr lang="en-US" smtClean="0"/>
-              <a:t>2023-08-16</a:t>
+              <a:t>2023-09-03</a:t>
             </a:fld>
             <a:endParaRPr lang="en-US"/>
           </a:p>
@@ -3250,23 +3277,14 @@
         </p:spPr>
         <p:txBody>
           <a:bodyPr>
-            <a:normAutofit fontScale="90000"/>
+            <a:normAutofit/>
           </a:bodyPr>
           <a:lstStyle/>
           <a:p>
             <a:r>
-              <a:rPr lang="en-US" b="1" dirty="0"/>
-              <a:t>First, lets try to think of some ideas without further context </a:t>
-            </a:r>
-            <a:r>
-              <a:rPr lang="en-US" dirty="0"/>
-              <a:t>– </a:t>
-            </a:r>
-            <a:r>
-              <a:rPr lang="en-US" sz="3600" i="1" dirty="0"/>
-              <a:t>just stream of consciousness thinking</a:t>
-            </a:r>
-            <a:endParaRPr lang="en-US" i="1" dirty="0"/>
+              <a:rPr lang="en-US" sz="4400" dirty="0"/>
+              <a:t>We are going to do a little experiment:</a:t>
+            </a:r>
           </a:p>
         </p:txBody>
       </p:sp>
@@ -3288,62 +3306,73 @@
         </p:nvSpPr>
         <p:spPr>
           <a:xfrm>
-            <a:off x="609600" y="1441594"/>
-            <a:ext cx="10972800" cy="4525963"/>
+            <a:off x="609600" y="1221691"/>
+            <a:ext cx="11038318" cy="5093651"/>
           </a:xfrm>
         </p:spPr>
         <p:txBody>
           <a:bodyPr>
-            <a:normAutofit fontScale="92500" lnSpcReduction="20000"/>
+            <a:normAutofit fontScale="92500" lnSpcReduction="10000"/>
           </a:bodyPr>
           <a:lstStyle/>
           <a:p>
-            <a:r>
-              <a:rPr lang="en-US" dirty="0"/>
-              <a:t>We are going to do a little experiment</a:t>
-            </a:r>
-          </a:p>
-          <a:p>
-            <a:r>
-              <a:rPr lang="en-US" dirty="0"/>
-              <a:t>My hypothesis is that, out of context or prompting, coming up with novel ideas will be hard.  However, given the context of a this being the first real week in school, you mind is probably overloaded with new experiences.</a:t>
-            </a:r>
-          </a:p>
-          <a:p>
-            <a:r>
-              <a:rPr lang="en-US" dirty="0"/>
-              <a:t>The first part is simple: everyone open the URL in the QR code</a:t>
-            </a:r>
-          </a:p>
-          <a:p>
-            <a:pPr marL="0" indent="0">
+            <a:pPr marL="0" indent="0" algn="ctr">
               <a:buNone/>
             </a:pPr>
             <a:r>
-              <a:rPr lang="en-US" dirty="0"/>
-              <a:t>(</a:t>
-            </a:r>
-            <a:r>
-              <a:rPr lang="en-US" dirty="0">
+              <a:rPr lang="en-US" sz="5600" b="1" dirty="0"/>
+              <a:t>Stream of consciousness try to think of new, novel ideas </a:t>
+            </a:r>
+          </a:p>
+          <a:p>
+            <a:pPr marL="0" indent="0" algn="ctr">
+              <a:buNone/>
+            </a:pPr>
+            <a:r>
+              <a:rPr lang="en-US" sz="4300" i="1" dirty="0"/>
+              <a:t>– what does "Idea" even mean to you? –</a:t>
+            </a:r>
+            <a:endParaRPr lang="en-US" sz="3000" dirty="0"/>
+          </a:p>
+          <a:p>
+            <a:r>
+              <a:rPr lang="en-US" sz="2600" dirty="0"/>
+              <a:t>My hypothesis is that, out of context or prompting, coming up with novel ideas will be hard.  However, given the context of a this being the first real week in school, your mind is probably overloaded with new experiences, so it will be interesting to see.</a:t>
+            </a:r>
+          </a:p>
+          <a:p>
+            <a:r>
+              <a:rPr lang="en-US" sz="2600" dirty="0"/>
+              <a:t>The first part is simple: everyone open the following URL or scan the QR code </a:t>
+            </a:r>
+            <a:br>
+              <a:rPr lang="en-US" sz="2600" dirty="0"/>
+            </a:br>
+            <a:r>
+              <a:rPr lang="en-US" sz="2600" dirty="0"/>
+              <a:t>( </a:t>
+            </a:r>
+            <a:r>
+              <a:rPr lang="en-US" sz="2600" dirty="0">
                 <a:hlinkClick r:id="rId2"/>
               </a:rPr>
-              <a:t>https://docs.google.com/document/d/1xKAoHRXPhJ05KPif0aCSNWa4hFib7CsztdNVHlEg5vk/edit?usp=sharing</a:t>
-            </a:r>
-            <a:r>
-              <a:rPr lang="en-US" dirty="0"/>
+              <a:t>https://otherrealm.org/unprompted</a:t>
+            </a:r>
+            <a:r>
+              <a:rPr lang="en-US" sz="2600" dirty="0"/>
               <a:t> )</a:t>
             </a:r>
           </a:p>
           <a:p>
             <a:r>
-              <a:rPr lang="en-US" dirty="0"/>
+              <a:rPr lang="en-US" sz="2600" dirty="0"/>
               <a:t>And, on a blank page write down all the ideas that </a:t>
             </a:r>
             <a:br>
-              <a:rPr lang="en-US" dirty="0"/>
+              <a:rPr lang="en-US" sz="2600" dirty="0"/>
             </a:br>
             <a:r>
-              <a:rPr lang="en-US" dirty="0"/>
+              <a:rPr lang="en-US" sz="2600" dirty="0"/>
               <a:t>pop into your head!</a:t>
             </a:r>
           </a:p>
@@ -3376,7 +3405,7 @@
         </p:blipFill>
         <p:spPr>
           <a:xfrm>
-            <a:off x="9990183" y="4653292"/>
+            <a:off x="9990183" y="4807120"/>
             <a:ext cx="1969806" cy="1969806"/>
           </a:xfrm>
           <a:prstGeom prst="rect">
@@ -3412,14 +3441,74 @@
           </a:bodyPr>
           <a:lstStyle/>
           <a:p>
-            <a:r>
-              <a:rPr lang="en-US" dirty="0"/>
+            <a:pPr marL="0" marR="0" lvl="0" indent="0" algn="l" defTabSz="914400" rtl="0" eaLnBrk="1" fontAlgn="auto" latinLnBrk="0" hangingPunct="1">
+              <a:lnSpc>
+                <a:spcPct val="100000"/>
+              </a:lnSpc>
+              <a:spcBef>
+                <a:spcPts val="0"/>
+              </a:spcBef>
+              <a:spcAft>
+                <a:spcPts val="0"/>
+              </a:spcAft>
+              <a:buClrTx/>
+              <a:buSzTx/>
+              <a:buFontTx/>
+              <a:buNone/>
+              <a:tabLst/>
+              <a:defRPr/>
+            </a:pPr>
+            <a:r>
+              <a:rPr kumimoji="0" lang="en-US" sz="1800" b="0" i="0" u="none" strike="noStrike" kern="1200" cap="none" spc="0" normalizeH="0" baseline="0" noProof="0" dirty="0">
+                <a:ln>
+                  <a:noFill/>
+                </a:ln>
+                <a:solidFill>
+                  <a:prstClr val="black"/>
+                </a:solidFill>
+                <a:effectLst/>
+                <a:uLnTx/>
+                <a:uFillTx/>
+                <a:latin typeface="Times New Roman"/>
+                <a:ea typeface="+mn-ea"/>
+                <a:cs typeface="+mn-cs"/>
+              </a:rPr>
               <a:t>Link to Google Doc</a:t>
             </a:r>
           </a:p>
           <a:p>
-            <a:r>
-              <a:rPr lang="en-US" dirty="0"/>
+            <a:pPr marL="0" marR="0" lvl="0" indent="0" algn="l" defTabSz="914400" rtl="0" eaLnBrk="1" fontAlgn="auto" latinLnBrk="0" hangingPunct="1">
+              <a:lnSpc>
+                <a:spcPct val="100000"/>
+              </a:lnSpc>
+              <a:spcBef>
+                <a:spcPts val="0"/>
+              </a:spcBef>
+              <a:spcAft>
+                <a:spcPts val="0"/>
+              </a:spcAft>
+              <a:buClrTx/>
+              <a:buSzTx/>
+              <a:buFontTx/>
+              <a:buNone/>
+              <a:tabLst/>
+              <a:defRPr/>
+            </a:pPr>
+            <a:r>
+              <a:rPr kumimoji="0" lang="en-US" sz="1800" b="0" i="0" u="none" strike="noStrike" kern="1200" cap="none" spc="0" normalizeH="0" baseline="0" noProof="0" dirty="0">
+                <a:ln>
+                  <a:noFill/>
+                </a:ln>
+                <a:solidFill>
+                  <a:prstClr val="black"/>
+                </a:solidFill>
+                <a:effectLst/>
+                <a:uLnTx/>
+                <a:uFillTx/>
+                <a:latin typeface="Times New Roman"/>
+                <a:ea typeface="+mn-ea"/>
+                <a:cs typeface="+mn-cs"/>
+              </a:rPr>
               <a:t>for ideas, no context</a:t>
             </a:r>
           </a:p>
@@ -3445,8 +3534,8 @@
             <a:chExt cx="730440" cy="549360"/>
           </a:xfrm>
         </p:grpSpPr>
-        <mc:AlternateContent xmlns:mc="http://schemas.openxmlformats.org/markup-compatibility/2006">
-          <mc:Choice xmlns:p14="http://schemas.microsoft.com/office/powerpoint/2010/main" Requires="p14">
+        <mc:AlternateContent xmlns:mc="http://schemas.openxmlformats.org/markup-compatibility/2006" xmlns:p14="http://schemas.microsoft.com/office/powerpoint/2010/main">
+          <mc:Choice Requires="p14">
             <p:contentPart p14:bwMode="auto" r:id="rId4">
               <p14:nvContentPartPr>
                 <p14:cNvPr id="4" name="Ink 3">
@@ -3465,7 +3554,7 @@
               </p14:xfrm>
             </p:contentPart>
           </mc:Choice>
-          <mc:Fallback>
+          <mc:Fallback xmlns="">
             <p:pic>
               <p:nvPicPr>
                 <p:cNvPr id="4" name="Ink 3">
@@ -3496,8 +3585,8 @@
             </p:pic>
           </mc:Fallback>
         </mc:AlternateContent>
-        <mc:AlternateContent xmlns:mc="http://schemas.openxmlformats.org/markup-compatibility/2006">
-          <mc:Choice xmlns:p14="http://schemas.microsoft.com/office/powerpoint/2010/main" Requires="p14">
+        <mc:AlternateContent xmlns:mc="http://schemas.openxmlformats.org/markup-compatibility/2006" xmlns:p14="http://schemas.microsoft.com/office/powerpoint/2010/main">
+          <mc:Choice Requires="p14">
             <p:contentPart p14:bwMode="auto" r:id="rId6">
               <p14:nvContentPartPr>
                 <p14:cNvPr id="7" name="Ink 6">
@@ -3516,7 +3605,7 @@
               </p14:xfrm>
             </p:contentPart>
           </mc:Choice>
-          <mc:Fallback>
+          <mc:Fallback xmlns="">
             <p:pic>
               <p:nvPicPr>
                 <p:cNvPr id="7" name="Ink 6">
@@ -3548,10 +3637,61 @@
           </mc:Fallback>
         </mc:AlternateContent>
       </p:grpSp>
+      <mc:AlternateContent xmlns:mc="http://schemas.openxmlformats.org/markup-compatibility/2006" xmlns:p14="http://schemas.microsoft.com/office/powerpoint/2010/main">
+        <mc:Choice Requires="p14">
+          <p:contentPart p14:bwMode="auto" r:id="rId8">
+            <p14:nvContentPartPr>
+              <p14:cNvPr id="9" name="Ink 8">
+                <a:extLst>
+                  <a:ext uri="{FF2B5EF4-FFF2-40B4-BE49-F238E27FC236}">
+                    <a16:creationId xmlns:a16="http://schemas.microsoft.com/office/drawing/2014/main" id="{6B574266-28F9-FE31-F8BE-8D9B39D6E057}"/>
+                  </a:ext>
+                </a:extLst>
+              </p14:cNvPr>
+              <p14:cNvContentPartPr/>
+              <p14:nvPr/>
+            </p14:nvContentPartPr>
+            <p14:xfrm>
+              <a:off x="3503180" y="3221304"/>
+              <a:ext cx="360" cy="360"/>
+            </p14:xfrm>
+          </p:contentPart>
+        </mc:Choice>
+        <mc:Fallback xmlns="">
+          <p:pic>
+            <p:nvPicPr>
+              <p:cNvPr id="9" name="Ink 8">
+                <a:extLst>
+                  <a:ext uri="{FF2B5EF4-FFF2-40B4-BE49-F238E27FC236}">
+                    <a16:creationId xmlns:a16="http://schemas.microsoft.com/office/drawing/2014/main" id="{6B574266-28F9-FE31-F8BE-8D9B39D6E057}"/>
+                  </a:ext>
+                </a:extLst>
+              </p:cNvPr>
+              <p:cNvPicPr/>
+              <p:nvPr/>
+            </p:nvPicPr>
+            <p:blipFill>
+              <a:blip r:embed="rId9"/>
+              <a:stretch>
+                <a:fillRect/>
+              </a:stretch>
+            </p:blipFill>
+            <p:spPr>
+              <a:xfrm>
+                <a:off x="3494540" y="3212664"/>
+                <a:ext cx="18000" cy="18000"/>
+              </a:xfrm>
+              <a:prstGeom prst="rect">
+                <a:avLst/>
+              </a:prstGeom>
+            </p:spPr>
+          </p:pic>
+        </mc:Fallback>
+      </mc:AlternateContent>
     </p:spTree>
     <p:extLst>
       <p:ext uri="{BB962C8B-B14F-4D97-AF65-F5344CB8AC3E}">
-        <p14:creationId xmlns:p14="http://schemas.microsoft.com/office/powerpoint/2010/main" val="1918750273"/>
+        <p14:creationId xmlns:p14="http://schemas.microsoft.com/office/powerpoint/2010/main" val="2006943235"/>
       </p:ext>
     </p:extLst>
   </p:cSld>
@@ -3909,7 +4049,22 @@
                 <a:effectLst/>
                 <a:latin typeface="times new roman" panose="02020603050405020304" pitchFamily="18" charset="0"/>
               </a:rPr>
-              <a:t>This week's assignment will be to finish getting set up the software/accounts we will be using during the rest of the semester and to read the syllabus.  </a:t>
+              <a:t>This week's assignment will be to finish getting set up the software/accounts we will be using during the rest of the semester and to read the syllabus. </a:t>
+            </a:r>
+          </a:p>
+          <a:p>
+            <a:r>
+              <a:rPr lang="en-US" dirty="0">
+                <a:latin typeface="times new roman" panose="02020603050405020304" pitchFamily="18" charset="0"/>
+              </a:rPr>
+              <a:t>Go to:</a:t>
+            </a:r>
+            <a:r>
+              <a:rPr lang="en-US" dirty="0">
+                <a:effectLst/>
+                <a:latin typeface="times new roman" panose="02020603050405020304" pitchFamily="18" charset="0"/>
+              </a:rPr>
+              <a:t> </a:t>
             </a:r>
             <a:endParaRPr lang="en-US" dirty="0"/>
           </a:p>

</xml_diff>